<commit_message>
Fixing the redlining maps and updating maps
Used MQHRS10 instead of NQHRS10 and re-uploaded pngs
</commit_message>
<xml_diff>
--- a/Maps/Presentation1.pptx
+++ b/Maps/Presentation1.pptx
@@ -5,7 +5,9 @@
     <p:sldMasterId id="2147483648" r:id="rId1"/>
   </p:sldMasterIdLst>
   <p:sldIdLst>
-    <p:sldId id="256" r:id="rId2"/>
+    <p:sldId id="258" r:id="rId2"/>
+    <p:sldId id="257" r:id="rId3"/>
+    <p:sldId id="259" r:id="rId4"/>
   </p:sldIdLst>
   <p:sldSz cx="12192000" cy="6858000"/>
   <p:notesSz cx="6858000" cy="9144000"/>
@@ -104,6 +106,11 @@
       </a:defRPr>
     </a:lvl9pPr>
   </p:defaultTextStyle>
+  <p:extLst>
+    <p:ext uri="{EFAFB233-063F-42B5-8137-9DF3F51BA10A}">
+      <p15:sldGuideLst xmlns:p15="http://schemas.microsoft.com/office/powerpoint/2012/main"/>
+    </p:ext>
+  </p:extLst>
 </p:presentation>
 </file>
 
@@ -254,7 +261,7 @@
           <a:p>
             <a:fld id="{B345E584-6127-B44F-9A13-018788E10131}" type="datetimeFigureOut">
               <a:rPr lang="en-US" smtClean="0"/>
-              <a:t>11/28/21</a:t>
+              <a:t>11/29/21</a:t>
             </a:fld>
             <a:endParaRPr lang="en-US"/>
           </a:p>
@@ -452,7 +459,7 @@
           <a:p>
             <a:fld id="{B345E584-6127-B44F-9A13-018788E10131}" type="datetimeFigureOut">
               <a:rPr lang="en-US" smtClean="0"/>
-              <a:t>11/28/21</a:t>
+              <a:t>11/29/21</a:t>
             </a:fld>
             <a:endParaRPr lang="en-US"/>
           </a:p>
@@ -660,7 +667,7 @@
           <a:p>
             <a:fld id="{B345E584-6127-B44F-9A13-018788E10131}" type="datetimeFigureOut">
               <a:rPr lang="en-US" smtClean="0"/>
-              <a:t>11/28/21</a:t>
+              <a:t>11/29/21</a:t>
             </a:fld>
             <a:endParaRPr lang="en-US"/>
           </a:p>
@@ -858,7 +865,7 @@
           <a:p>
             <a:fld id="{B345E584-6127-B44F-9A13-018788E10131}" type="datetimeFigureOut">
               <a:rPr lang="en-US" smtClean="0"/>
-              <a:t>11/28/21</a:t>
+              <a:t>11/29/21</a:t>
             </a:fld>
             <a:endParaRPr lang="en-US"/>
           </a:p>
@@ -1133,7 +1140,7 @@
           <a:p>
             <a:fld id="{B345E584-6127-B44F-9A13-018788E10131}" type="datetimeFigureOut">
               <a:rPr lang="en-US" smtClean="0"/>
-              <a:t>11/28/21</a:t>
+              <a:t>11/29/21</a:t>
             </a:fld>
             <a:endParaRPr lang="en-US"/>
           </a:p>
@@ -1398,7 +1405,7 @@
           <a:p>
             <a:fld id="{B345E584-6127-B44F-9A13-018788E10131}" type="datetimeFigureOut">
               <a:rPr lang="en-US" smtClean="0"/>
-              <a:t>11/28/21</a:t>
+              <a:t>11/29/21</a:t>
             </a:fld>
             <a:endParaRPr lang="en-US"/>
           </a:p>
@@ -1810,7 +1817,7 @@
           <a:p>
             <a:fld id="{B345E584-6127-B44F-9A13-018788E10131}" type="datetimeFigureOut">
               <a:rPr lang="en-US" smtClean="0"/>
-              <a:t>11/28/21</a:t>
+              <a:t>11/29/21</a:t>
             </a:fld>
             <a:endParaRPr lang="en-US"/>
           </a:p>
@@ -1951,7 +1958,7 @@
           <a:p>
             <a:fld id="{B345E584-6127-B44F-9A13-018788E10131}" type="datetimeFigureOut">
               <a:rPr lang="en-US" smtClean="0"/>
-              <a:t>11/28/21</a:t>
+              <a:t>11/29/21</a:t>
             </a:fld>
             <a:endParaRPr lang="en-US"/>
           </a:p>
@@ -2064,7 +2071,7 @@
           <a:p>
             <a:fld id="{B345E584-6127-B44F-9A13-018788E10131}" type="datetimeFigureOut">
               <a:rPr lang="en-US" smtClean="0"/>
-              <a:t>11/28/21</a:t>
+              <a:t>11/29/21</a:t>
             </a:fld>
             <a:endParaRPr lang="en-US"/>
           </a:p>
@@ -2375,7 +2382,7 @@
           <a:p>
             <a:fld id="{B345E584-6127-B44F-9A13-018788E10131}" type="datetimeFigureOut">
               <a:rPr lang="en-US" smtClean="0"/>
-              <a:t>11/28/21</a:t>
+              <a:t>11/29/21</a:t>
             </a:fld>
             <a:endParaRPr lang="en-US"/>
           </a:p>
@@ -2663,7 +2670,7 @@
           <a:p>
             <a:fld id="{B345E584-6127-B44F-9A13-018788E10131}" type="datetimeFigureOut">
               <a:rPr lang="en-US" smtClean="0"/>
-              <a:t>11/28/21</a:t>
+              <a:t>11/29/21</a:t>
             </a:fld>
             <a:endParaRPr lang="en-US"/>
           </a:p>
@@ -2904,7 +2911,7 @@
           <a:p>
             <a:fld id="{B345E584-6127-B44F-9A13-018788E10131}" type="datetimeFigureOut">
               <a:rPr lang="en-US" smtClean="0"/>
-              <a:t>11/28/21</a:t>
+              <a:t>11/29/21</a:t>
             </a:fld>
             <a:endParaRPr lang="en-US"/>
           </a:p>
@@ -3323,10 +3330,215 @@
       </p:grpSpPr>
       <p:pic>
         <p:nvPicPr>
-          <p:cNvPr id="8" name="Picture 7" descr="Map&#10;&#10;Description automatically generated">
-            <a:extLst>
-              <a:ext uri="{FF2B5EF4-FFF2-40B4-BE49-F238E27FC236}">
-                <a16:creationId xmlns:a16="http://schemas.microsoft.com/office/drawing/2014/main" id="{A6698CE1-ECB2-0A4C-B993-5319EE108C4B}"/>
+          <p:cNvPr id="20" name="Picture 19" descr="Text&#10;&#10;Description automatically generated">
+            <a:extLst>
+              <a:ext uri="{FF2B5EF4-FFF2-40B4-BE49-F238E27FC236}">
+                <a16:creationId xmlns:a16="http://schemas.microsoft.com/office/drawing/2014/main" id="{39596322-8BC9-3740-ACA6-DCEA7C7AAD45}"/>
+              </a:ext>
+            </a:extLst>
+          </p:cNvPr>
+          <p:cNvPicPr>
+            <a:picLocks noChangeAspect="1"/>
+          </p:cNvPicPr>
+          <p:nvPr/>
+        </p:nvPicPr>
+        <p:blipFill>
+          <a:blip r:embed="rId2"/>
+          <a:stretch>
+            <a:fillRect/>
+          </a:stretch>
+        </p:blipFill>
+        <p:spPr>
+          <a:xfrm>
+            <a:off x="5875508" y="3929676"/>
+            <a:ext cx="2286000" cy="1079500"/>
+          </a:xfrm>
+          <a:prstGeom prst="rect">
+            <a:avLst/>
+          </a:prstGeom>
+        </p:spPr>
+      </p:pic>
+      <p:sp>
+        <p:nvSpPr>
+          <p:cNvPr id="21" name="TextBox 20">
+            <a:extLst>
+              <a:ext uri="{FF2B5EF4-FFF2-40B4-BE49-F238E27FC236}">
+                <a16:creationId xmlns:a16="http://schemas.microsoft.com/office/drawing/2014/main" id="{F92FEA2B-0387-DC48-A076-F6033AE85519}"/>
+              </a:ext>
+            </a:extLst>
+          </p:cNvPr>
+          <p:cNvSpPr txBox="1"/>
+          <p:nvPr/>
+        </p:nvSpPr>
+        <p:spPr>
+          <a:xfrm>
+            <a:off x="917857" y="547007"/>
+            <a:ext cx="802848" cy="338554"/>
+          </a:xfrm>
+          <a:prstGeom prst="rect">
+            <a:avLst/>
+          </a:prstGeom>
+          <a:noFill/>
+        </p:spPr>
+        <p:txBody>
+          <a:bodyPr wrap="none" rtlCol="0">
+            <a:spAutoFit/>
+          </a:bodyPr>
+          <a:lstStyle/>
+          <a:p>
+            <a:r>
+              <a:rPr lang="en-US" sz="1600" b="1" dirty="0"/>
+              <a:t>Atlanta</a:t>
+            </a:r>
+          </a:p>
+        </p:txBody>
+      </p:sp>
+      <p:sp>
+        <p:nvSpPr>
+          <p:cNvPr id="22" name="TextBox 21">
+            <a:extLst>
+              <a:ext uri="{FF2B5EF4-FFF2-40B4-BE49-F238E27FC236}">
+                <a16:creationId xmlns:a16="http://schemas.microsoft.com/office/drawing/2014/main" id="{842FFA3C-2D76-DF4D-AA2A-8789221DAC00}"/>
+              </a:ext>
+            </a:extLst>
+          </p:cNvPr>
+          <p:cNvSpPr txBox="1"/>
+          <p:nvPr/>
+        </p:nvSpPr>
+        <p:spPr>
+          <a:xfrm>
+            <a:off x="3285476" y="547007"/>
+            <a:ext cx="877676" cy="338554"/>
+          </a:xfrm>
+          <a:prstGeom prst="rect">
+            <a:avLst/>
+          </a:prstGeom>
+          <a:noFill/>
+        </p:spPr>
+        <p:txBody>
+          <a:bodyPr wrap="none" rtlCol="0">
+            <a:spAutoFit/>
+          </a:bodyPr>
+          <a:lstStyle/>
+          <a:p>
+            <a:r>
+              <a:rPr lang="en-US" sz="1600" b="1" dirty="0"/>
+              <a:t>Augusta</a:t>
+            </a:r>
+          </a:p>
+        </p:txBody>
+      </p:sp>
+      <p:sp>
+        <p:nvSpPr>
+          <p:cNvPr id="23" name="TextBox 22">
+            <a:extLst>
+              <a:ext uri="{FF2B5EF4-FFF2-40B4-BE49-F238E27FC236}">
+                <a16:creationId xmlns:a16="http://schemas.microsoft.com/office/drawing/2014/main" id="{E04082CB-73EB-8245-BA31-B115682BD5D6}"/>
+              </a:ext>
+            </a:extLst>
+          </p:cNvPr>
+          <p:cNvSpPr txBox="1"/>
+          <p:nvPr/>
+        </p:nvSpPr>
+        <p:spPr>
+          <a:xfrm>
+            <a:off x="5659593" y="555422"/>
+            <a:ext cx="1034257" cy="338554"/>
+          </a:xfrm>
+          <a:prstGeom prst="rect">
+            <a:avLst/>
+          </a:prstGeom>
+          <a:noFill/>
+        </p:spPr>
+        <p:txBody>
+          <a:bodyPr wrap="none" rtlCol="0">
+            <a:spAutoFit/>
+          </a:bodyPr>
+          <a:lstStyle/>
+          <a:p>
+            <a:r>
+              <a:rPr lang="en-US" sz="1600" b="1" dirty="0"/>
+              <a:t>Columbus</a:t>
+            </a:r>
+          </a:p>
+        </p:txBody>
+      </p:sp>
+      <p:sp>
+        <p:nvSpPr>
+          <p:cNvPr id="24" name="TextBox 23">
+            <a:extLst>
+              <a:ext uri="{FF2B5EF4-FFF2-40B4-BE49-F238E27FC236}">
+                <a16:creationId xmlns:a16="http://schemas.microsoft.com/office/drawing/2014/main" id="{157B102A-253E-3148-ABF2-7BD43196663B}"/>
+              </a:ext>
+            </a:extLst>
+          </p:cNvPr>
+          <p:cNvSpPr txBox="1"/>
+          <p:nvPr/>
+        </p:nvSpPr>
+        <p:spPr>
+          <a:xfrm>
+            <a:off x="917857" y="3224012"/>
+            <a:ext cx="771943" cy="338554"/>
+          </a:xfrm>
+          <a:prstGeom prst="rect">
+            <a:avLst/>
+          </a:prstGeom>
+          <a:noFill/>
+        </p:spPr>
+        <p:txBody>
+          <a:bodyPr wrap="none" rtlCol="0">
+            <a:spAutoFit/>
+          </a:bodyPr>
+          <a:lstStyle/>
+          <a:p>
+            <a:r>
+              <a:rPr lang="en-US" sz="1600" b="1" dirty="0"/>
+              <a:t>Macon</a:t>
+            </a:r>
+          </a:p>
+        </p:txBody>
+      </p:sp>
+      <p:sp>
+        <p:nvSpPr>
+          <p:cNvPr id="25" name="TextBox 24">
+            <a:extLst>
+              <a:ext uri="{FF2B5EF4-FFF2-40B4-BE49-F238E27FC236}">
+                <a16:creationId xmlns:a16="http://schemas.microsoft.com/office/drawing/2014/main" id="{5DE5685D-1267-B344-B754-48B3EBCC8683}"/>
+              </a:ext>
+            </a:extLst>
+          </p:cNvPr>
+          <p:cNvSpPr txBox="1"/>
+          <p:nvPr/>
+        </p:nvSpPr>
+        <p:spPr>
+          <a:xfrm>
+            <a:off x="3362889" y="3224012"/>
+            <a:ext cx="1009122" cy="338554"/>
+          </a:xfrm>
+          <a:prstGeom prst="rect">
+            <a:avLst/>
+          </a:prstGeom>
+          <a:noFill/>
+        </p:spPr>
+        <p:txBody>
+          <a:bodyPr wrap="none" rtlCol="0">
+            <a:spAutoFit/>
+          </a:bodyPr>
+          <a:lstStyle/>
+          <a:p>
+            <a:r>
+              <a:rPr lang="en-US" sz="1600" b="1" dirty="0"/>
+              <a:t>Savannah</a:t>
+            </a:r>
+          </a:p>
+        </p:txBody>
+      </p:sp>
+      <p:pic>
+        <p:nvPicPr>
+          <p:cNvPr id="3" name="Picture 2" descr="Map&#10;&#10;Description automatically generated">
+            <a:extLst>
+              <a:ext uri="{FF2B5EF4-FFF2-40B4-BE49-F238E27FC236}">
+                <a16:creationId xmlns:a16="http://schemas.microsoft.com/office/drawing/2014/main" id="{9ECA6B69-CB7E-E644-BA29-0545F449F525}"/>
               </a:ext>
             </a:extLst>
           </p:cNvPr>
@@ -3336,14 +3548,14 @@
           <p:nvPr/>
         </p:nvPicPr>
         <p:blipFill rotWithShape="1">
-          <a:blip r:embed="rId2"/>
-          <a:srcRect l="18255" t="7527" r="18083"/>
+          <a:blip r:embed="rId3"/>
+          <a:srcRect t="8030"/>
           <a:stretch/>
         </p:blipFill>
         <p:spPr>
           <a:xfrm>
-            <a:off x="872359" y="782153"/>
-            <a:ext cx="2524633" cy="2486871"/>
+            <a:off x="938955" y="866515"/>
+            <a:ext cx="2296166" cy="2327713"/>
           </a:xfrm>
           <a:prstGeom prst="rect">
             <a:avLst/>
@@ -3357,10 +3569,10 @@
       </p:pic>
       <p:pic>
         <p:nvPicPr>
-          <p:cNvPr id="10" name="Picture 9" descr="Map&#10;&#10;Description automatically generated">
-            <a:extLst>
-              <a:ext uri="{FF2B5EF4-FFF2-40B4-BE49-F238E27FC236}">
-                <a16:creationId xmlns:a16="http://schemas.microsoft.com/office/drawing/2014/main" id="{7A5343B4-146A-A341-8DA9-07D2C2CD0CE8}"/>
+          <p:cNvPr id="5" name="Picture 4" descr="Map&#10;&#10;Description automatically generated">
+            <a:extLst>
+              <a:ext uri="{FF2B5EF4-FFF2-40B4-BE49-F238E27FC236}">
+                <a16:creationId xmlns:a16="http://schemas.microsoft.com/office/drawing/2014/main" id="{B37680C6-D632-5849-A69D-8510E3E83241}"/>
               </a:ext>
             </a:extLst>
           </p:cNvPr>
@@ -3370,14 +3582,14 @@
           <p:nvPr/>
         </p:nvPicPr>
         <p:blipFill rotWithShape="1">
-          <a:blip r:embed="rId3"/>
-          <a:srcRect l="18653" t="8764" r="18464"/>
+          <a:blip r:embed="rId4"/>
+          <a:srcRect t="8485"/>
           <a:stretch/>
         </p:blipFill>
         <p:spPr>
           <a:xfrm>
-            <a:off x="3520052" y="784967"/>
-            <a:ext cx="2533908" cy="2493800"/>
+            <a:off x="3320122" y="866514"/>
+            <a:ext cx="2296165" cy="2317889"/>
           </a:xfrm>
           <a:prstGeom prst="rect">
             <a:avLst/>
@@ -3391,10 +3603,10 @@
       </p:pic>
       <p:pic>
         <p:nvPicPr>
-          <p:cNvPr id="12" name="Picture 11" descr="Map&#10;&#10;Description automatically generated">
-            <a:extLst>
-              <a:ext uri="{FF2B5EF4-FFF2-40B4-BE49-F238E27FC236}">
-                <a16:creationId xmlns:a16="http://schemas.microsoft.com/office/drawing/2014/main" id="{A23A2103-679B-074A-BBE5-3F8840E401EA}"/>
+          <p:cNvPr id="7" name="Picture 6" descr="Map&#10;&#10;Description automatically generated">
+            <a:extLst>
+              <a:ext uri="{FF2B5EF4-FFF2-40B4-BE49-F238E27FC236}">
+                <a16:creationId xmlns:a16="http://schemas.microsoft.com/office/drawing/2014/main" id="{3B4D792D-8421-5F47-A787-F712DB6A1C49}"/>
               </a:ext>
             </a:extLst>
           </p:cNvPr>
@@ -3404,14 +3616,14 @@
           <p:nvPr/>
         </p:nvPicPr>
         <p:blipFill rotWithShape="1">
-          <a:blip r:embed="rId4"/>
-          <a:srcRect l="18723" t="8712" r="18399"/>
+          <a:blip r:embed="rId5"/>
+          <a:srcRect t="8701"/>
           <a:stretch/>
         </p:blipFill>
         <p:spPr>
           <a:xfrm>
-            <a:off x="6211441" y="782153"/>
-            <a:ext cx="2536768" cy="2496614"/>
+            <a:off x="5706826" y="866514"/>
+            <a:ext cx="2316455" cy="2327713"/>
           </a:xfrm>
           <a:prstGeom prst="rect">
             <a:avLst/>
@@ -3425,10 +3637,10 @@
       </p:pic>
       <p:pic>
         <p:nvPicPr>
-          <p:cNvPr id="14" name="Picture 13" descr="Map&#10;&#10;Description automatically generated">
-            <a:extLst>
-              <a:ext uri="{FF2B5EF4-FFF2-40B4-BE49-F238E27FC236}">
-                <a16:creationId xmlns:a16="http://schemas.microsoft.com/office/drawing/2014/main" id="{3BDFC41D-633F-FB4E-8C61-95FD9DCEA587}"/>
+          <p:cNvPr id="11" name="Picture 10" descr="Map&#10;&#10;Description automatically generated">
+            <a:extLst>
+              <a:ext uri="{FF2B5EF4-FFF2-40B4-BE49-F238E27FC236}">
+                <a16:creationId xmlns:a16="http://schemas.microsoft.com/office/drawing/2014/main" id="{258F823B-30CE-7A41-BDF4-A0DABB3D9A51}"/>
               </a:ext>
             </a:extLst>
           </p:cNvPr>
@@ -3438,14 +3650,14 @@
           <p:nvPr/>
         </p:nvPicPr>
         <p:blipFill rotWithShape="1">
-          <a:blip r:embed="rId5"/>
-          <a:srcRect l="19057" t="9964" r="18765"/>
+          <a:blip r:embed="rId6"/>
+          <a:srcRect t="9091"/>
           <a:stretch/>
         </p:blipFill>
         <p:spPr>
           <a:xfrm>
-            <a:off x="863084" y="3564927"/>
-            <a:ext cx="2533908" cy="2491403"/>
+            <a:off x="938955" y="3524470"/>
+            <a:ext cx="2324792" cy="2327714"/>
           </a:xfrm>
           <a:prstGeom prst="rect">
             <a:avLst/>
@@ -3459,10 +3671,10 @@
       </p:pic>
       <p:pic>
         <p:nvPicPr>
-          <p:cNvPr id="18" name="Picture 17" descr="Map&#10;&#10;Description automatically generated with medium confidence">
-            <a:extLst>
-              <a:ext uri="{FF2B5EF4-FFF2-40B4-BE49-F238E27FC236}">
-                <a16:creationId xmlns:a16="http://schemas.microsoft.com/office/drawing/2014/main" id="{DE5AEDE4-34D6-D749-9DFB-4CA74BB48704}"/>
+          <p:cNvPr id="15" name="Picture 14" descr="Map&#10;&#10;Description automatically generated with low confidence">
+            <a:extLst>
+              <a:ext uri="{FF2B5EF4-FFF2-40B4-BE49-F238E27FC236}">
+                <a16:creationId xmlns:a16="http://schemas.microsoft.com/office/drawing/2014/main" id="{B4236CAD-6A3C-D041-AF9A-F5673BE22446}"/>
               </a:ext>
             </a:extLst>
           </p:cNvPr>
@@ -3472,14 +3684,14 @@
           <p:nvPr/>
         </p:nvPicPr>
         <p:blipFill rotWithShape="1">
-          <a:blip r:embed="rId6"/>
-          <a:srcRect l="19562" t="12341" r="19939"/>
+          <a:blip r:embed="rId7"/>
+          <a:srcRect t="9845"/>
           <a:stretch/>
         </p:blipFill>
         <p:spPr>
           <a:xfrm>
-            <a:off x="3536456" y="3564929"/>
-            <a:ext cx="2538524" cy="2491401"/>
+            <a:off x="3352498" y="3524472"/>
+            <a:ext cx="2343937" cy="2327712"/>
           </a:xfrm>
           <a:prstGeom prst="rect">
             <a:avLst/>
@@ -3491,12 +3703,42 @@
           </a:ln>
         </p:spPr>
       </p:pic>
+    </p:spTree>
+    <p:extLst>
+      <p:ext uri="{BB962C8B-B14F-4D97-AF65-F5344CB8AC3E}">
+        <p14:creationId xmlns:p14="http://schemas.microsoft.com/office/powerpoint/2010/main" val="2747011099"/>
+      </p:ext>
+    </p:extLst>
+  </p:cSld>
+  <p:clrMapOvr>
+    <a:masterClrMapping/>
+  </p:clrMapOvr>
+</p:sld>
+</file>
+
+<file path=ppt/slides/slide2.xml><?xml version="1.0" encoding="utf-8"?>
+<p:sld xmlns:a="http://schemas.openxmlformats.org/drawingml/2006/main" xmlns:r="http://schemas.openxmlformats.org/officeDocument/2006/relationships" xmlns:p="http://schemas.openxmlformats.org/presentationml/2006/main">
+  <p:cSld>
+    <p:spTree>
+      <p:nvGrpSpPr>
+        <p:cNvPr id="1" name=""/>
+        <p:cNvGrpSpPr/>
+        <p:nvPr/>
+      </p:nvGrpSpPr>
+      <p:grpSpPr>
+        <a:xfrm>
+          <a:off x="0" y="0"/>
+          <a:ext cx="0" cy="0"/>
+          <a:chOff x="0" y="0"/>
+          <a:chExt cx="0" cy="0"/>
+        </a:xfrm>
+      </p:grpSpPr>
       <p:pic>
         <p:nvPicPr>
-          <p:cNvPr id="20" name="Picture 19" descr="Text&#10;&#10;Description automatically generated">
-            <a:extLst>
-              <a:ext uri="{FF2B5EF4-FFF2-40B4-BE49-F238E27FC236}">
-                <a16:creationId xmlns:a16="http://schemas.microsoft.com/office/drawing/2014/main" id="{39596322-8BC9-3740-ACA6-DCEA7C7AAD45}"/>
+          <p:cNvPr id="6" name="Picture 5" descr="Diagram, calendar&#10;&#10;Description automatically generated">
+            <a:extLst>
+              <a:ext uri="{FF2B5EF4-FFF2-40B4-BE49-F238E27FC236}">
+                <a16:creationId xmlns:a16="http://schemas.microsoft.com/office/drawing/2014/main" id="{FF2CD922-1DE4-F549-B82A-0EFFB2883967}"/>
               </a:ext>
             </a:extLst>
           </p:cNvPr>
@@ -3506,200 +3748,55 @@
           <p:nvPr/>
         </p:nvPicPr>
         <p:blipFill>
-          <a:blip r:embed="rId7"/>
+          <a:blip r:embed="rId2"/>
           <a:stretch>
             <a:fillRect/>
           </a:stretch>
         </p:blipFill>
         <p:spPr>
           <a:xfrm>
-            <a:off x="6336825" y="4064759"/>
-            <a:ext cx="2286000" cy="1079500"/>
+            <a:off x="2990305" y="0"/>
+            <a:ext cx="6211389" cy="6858000"/>
           </a:xfrm>
           <a:prstGeom prst="rect">
             <a:avLst/>
           </a:prstGeom>
         </p:spPr>
       </p:pic>
-      <p:sp>
-        <p:nvSpPr>
-          <p:cNvPr id="21" name="TextBox 20">
-            <a:extLst>
-              <a:ext uri="{FF2B5EF4-FFF2-40B4-BE49-F238E27FC236}">
-                <a16:creationId xmlns:a16="http://schemas.microsoft.com/office/drawing/2014/main" id="{F92FEA2B-0387-DC48-A076-F6033AE85519}"/>
-              </a:ext>
-            </a:extLst>
-          </p:cNvPr>
-          <p:cNvSpPr txBox="1"/>
-          <p:nvPr/>
-        </p:nvSpPr>
-        <p:spPr>
-          <a:xfrm>
-            <a:off x="863084" y="443599"/>
-            <a:ext cx="802848" cy="338554"/>
-          </a:xfrm>
-          <a:prstGeom prst="rect">
-            <a:avLst/>
-          </a:prstGeom>
-          <a:noFill/>
-        </p:spPr>
-        <p:txBody>
-          <a:bodyPr wrap="none" rtlCol="0">
-            <a:spAutoFit/>
-          </a:bodyPr>
-          <a:lstStyle/>
-          <a:p>
-            <a:r>
-              <a:rPr lang="en-US" sz="1600" b="1" dirty="0"/>
-              <a:t>Atlanta</a:t>
-            </a:r>
-          </a:p>
-        </p:txBody>
-      </p:sp>
-      <p:sp>
-        <p:nvSpPr>
-          <p:cNvPr id="22" name="TextBox 21">
-            <a:extLst>
-              <a:ext uri="{FF2B5EF4-FFF2-40B4-BE49-F238E27FC236}">
-                <a16:creationId xmlns:a16="http://schemas.microsoft.com/office/drawing/2014/main" id="{842FFA3C-2D76-DF4D-AA2A-8789221DAC00}"/>
-              </a:ext>
-            </a:extLst>
-          </p:cNvPr>
-          <p:cNvSpPr txBox="1"/>
-          <p:nvPr/>
-        </p:nvSpPr>
-        <p:spPr>
-          <a:xfrm>
-            <a:off x="3536456" y="443599"/>
-            <a:ext cx="877676" cy="338554"/>
-          </a:xfrm>
-          <a:prstGeom prst="rect">
-            <a:avLst/>
-          </a:prstGeom>
-          <a:noFill/>
-        </p:spPr>
-        <p:txBody>
-          <a:bodyPr wrap="none" rtlCol="0">
-            <a:spAutoFit/>
-          </a:bodyPr>
-          <a:lstStyle/>
-          <a:p>
-            <a:r>
-              <a:rPr lang="en-US" sz="1600" b="1" dirty="0"/>
-              <a:t>Augusta</a:t>
-            </a:r>
-          </a:p>
-        </p:txBody>
-      </p:sp>
-      <p:sp>
-        <p:nvSpPr>
-          <p:cNvPr id="23" name="TextBox 22">
-            <a:extLst>
-              <a:ext uri="{FF2B5EF4-FFF2-40B4-BE49-F238E27FC236}">
-                <a16:creationId xmlns:a16="http://schemas.microsoft.com/office/drawing/2014/main" id="{E04082CB-73EB-8245-BA31-B115682BD5D6}"/>
-              </a:ext>
-            </a:extLst>
-          </p:cNvPr>
-          <p:cNvSpPr txBox="1"/>
-          <p:nvPr/>
-        </p:nvSpPr>
-        <p:spPr>
-          <a:xfrm>
-            <a:off x="6211441" y="427124"/>
-            <a:ext cx="1034257" cy="338554"/>
-          </a:xfrm>
-          <a:prstGeom prst="rect">
-            <a:avLst/>
-          </a:prstGeom>
-          <a:noFill/>
-        </p:spPr>
-        <p:txBody>
-          <a:bodyPr wrap="none" rtlCol="0">
-            <a:spAutoFit/>
-          </a:bodyPr>
-          <a:lstStyle/>
-          <a:p>
-            <a:r>
-              <a:rPr lang="en-US" sz="1600" b="1" dirty="0"/>
-              <a:t>Columbus</a:t>
-            </a:r>
-          </a:p>
-        </p:txBody>
-      </p:sp>
-      <p:sp>
-        <p:nvSpPr>
-          <p:cNvPr id="24" name="TextBox 23">
-            <a:extLst>
-              <a:ext uri="{FF2B5EF4-FFF2-40B4-BE49-F238E27FC236}">
-                <a16:creationId xmlns:a16="http://schemas.microsoft.com/office/drawing/2014/main" id="{157B102A-253E-3148-ABF2-7BD43196663B}"/>
-              </a:ext>
-            </a:extLst>
-          </p:cNvPr>
-          <p:cNvSpPr txBox="1"/>
-          <p:nvPr/>
-        </p:nvSpPr>
-        <p:spPr>
-          <a:xfrm>
-            <a:off x="863084" y="3278591"/>
-            <a:ext cx="771943" cy="338554"/>
-          </a:xfrm>
-          <a:prstGeom prst="rect">
-            <a:avLst/>
-          </a:prstGeom>
-          <a:noFill/>
-        </p:spPr>
-        <p:txBody>
-          <a:bodyPr wrap="none" rtlCol="0">
-            <a:spAutoFit/>
-          </a:bodyPr>
-          <a:lstStyle/>
-          <a:p>
-            <a:r>
-              <a:rPr lang="en-US" sz="1600" b="1" dirty="0"/>
-              <a:t>Macon</a:t>
-            </a:r>
-          </a:p>
-        </p:txBody>
-      </p:sp>
-      <p:sp>
-        <p:nvSpPr>
-          <p:cNvPr id="25" name="TextBox 24">
-            <a:extLst>
-              <a:ext uri="{FF2B5EF4-FFF2-40B4-BE49-F238E27FC236}">
-                <a16:creationId xmlns:a16="http://schemas.microsoft.com/office/drawing/2014/main" id="{5DE5685D-1267-B344-B754-48B3EBCC8683}"/>
-              </a:ext>
-            </a:extLst>
-          </p:cNvPr>
-          <p:cNvSpPr txBox="1"/>
-          <p:nvPr/>
-        </p:nvSpPr>
-        <p:spPr>
-          <a:xfrm>
-            <a:off x="3520052" y="3302465"/>
-            <a:ext cx="1009122" cy="338554"/>
-          </a:xfrm>
-          <a:prstGeom prst="rect">
-            <a:avLst/>
-          </a:prstGeom>
-          <a:noFill/>
-        </p:spPr>
-        <p:txBody>
-          <a:bodyPr wrap="none" rtlCol="0">
-            <a:spAutoFit/>
-          </a:bodyPr>
-          <a:lstStyle/>
-          <a:p>
-            <a:r>
-              <a:rPr lang="en-US" sz="1600" b="1" dirty="0"/>
-              <a:t>Savannah</a:t>
-            </a:r>
-          </a:p>
-        </p:txBody>
-      </p:sp>
     </p:spTree>
     <p:extLst>
       <p:ext uri="{BB962C8B-B14F-4D97-AF65-F5344CB8AC3E}">
-        <p14:creationId xmlns:p14="http://schemas.microsoft.com/office/powerpoint/2010/main" val="3019103375"/>
+        <p14:creationId xmlns:p14="http://schemas.microsoft.com/office/powerpoint/2010/main" val="3140320008"/>
+      </p:ext>
+    </p:extLst>
+  </p:cSld>
+  <p:clrMapOvr>
+    <a:masterClrMapping/>
+  </p:clrMapOvr>
+</p:sld>
+</file>
+
+<file path=ppt/slides/slide3.xml><?xml version="1.0" encoding="utf-8"?>
+<p:sld xmlns:a="http://schemas.openxmlformats.org/drawingml/2006/main" xmlns:r="http://schemas.openxmlformats.org/officeDocument/2006/relationships" xmlns:p="http://schemas.openxmlformats.org/presentationml/2006/main">
+  <p:cSld>
+    <p:spTree>
+      <p:nvGrpSpPr>
+        <p:cNvPr id="1" name=""/>
+        <p:cNvGrpSpPr/>
+        <p:nvPr/>
+      </p:nvGrpSpPr>
+      <p:grpSpPr>
+        <a:xfrm>
+          <a:off x="0" y="0"/>
+          <a:ext cx="0" cy="0"/>
+          <a:chOff x="0" y="0"/>
+          <a:chExt cx="0" cy="0"/>
+        </a:xfrm>
+      </p:grpSpPr>
+    </p:spTree>
+    <p:extLst>
+      <p:ext uri="{BB962C8B-B14F-4D97-AF65-F5344CB8AC3E}">
+        <p14:creationId xmlns:p14="http://schemas.microsoft.com/office/powerpoint/2010/main" val="1313355749"/>
       </p:ext>
     </p:extLst>
   </p:cSld>

</xml_diff>